<commit_message>
Falta a imagem da simulação sem rota
</commit_message>
<xml_diff>
--- a/03_Trabalhos/Modelo EA/ModeloEA_EPE.pptx
+++ b/03_Trabalhos/Modelo EA/ModeloEA_EPE.pptx
@@ -104,6 +104,11 @@
       </a:defRPr>
     </a:lvl9pPr>
   </p:defaultTextStyle>
+  <p:extLst>
+    <p:ext uri="{EFAFB233-063F-42B5-8137-9DF3F51BA10A}">
+      <p15:sldGuideLst xmlns:p15="http://schemas.microsoft.com/office/powerpoint/2012/main"/>
+    </p:ext>
+  </p:extLst>
 </p:presentation>
 </file>
 
@@ -254,7 +259,7 @@
           <a:p>
             <a:fld id="{45A5B844-6202-4F57-AC75-16D329F31978}" type="datetimeFigureOut">
               <a:rPr lang="pt-PT" smtClean="0"/>
-              <a:t>27/11/2023</a:t>
+              <a:t>03/12/2023</a:t>
             </a:fld>
             <a:endParaRPr lang="pt-PT"/>
           </a:p>
@@ -452,7 +457,7 @@
           <a:p>
             <a:fld id="{45A5B844-6202-4F57-AC75-16D329F31978}" type="datetimeFigureOut">
               <a:rPr lang="pt-PT" smtClean="0"/>
-              <a:t>27/11/2023</a:t>
+              <a:t>03/12/2023</a:t>
             </a:fld>
             <a:endParaRPr lang="pt-PT"/>
           </a:p>
@@ -660,7 +665,7 @@
           <a:p>
             <a:fld id="{45A5B844-6202-4F57-AC75-16D329F31978}" type="datetimeFigureOut">
               <a:rPr lang="pt-PT" smtClean="0"/>
-              <a:t>27/11/2023</a:t>
+              <a:t>03/12/2023</a:t>
             </a:fld>
             <a:endParaRPr lang="pt-PT"/>
           </a:p>
@@ -858,7 +863,7 @@
           <a:p>
             <a:fld id="{45A5B844-6202-4F57-AC75-16D329F31978}" type="datetimeFigureOut">
               <a:rPr lang="pt-PT" smtClean="0"/>
-              <a:t>27/11/2023</a:t>
+              <a:t>03/12/2023</a:t>
             </a:fld>
             <a:endParaRPr lang="pt-PT"/>
           </a:p>
@@ -1133,7 +1138,7 @@
           <a:p>
             <a:fld id="{45A5B844-6202-4F57-AC75-16D329F31978}" type="datetimeFigureOut">
               <a:rPr lang="pt-PT" smtClean="0"/>
-              <a:t>27/11/2023</a:t>
+              <a:t>03/12/2023</a:t>
             </a:fld>
             <a:endParaRPr lang="pt-PT"/>
           </a:p>
@@ -1398,7 +1403,7 @@
           <a:p>
             <a:fld id="{45A5B844-6202-4F57-AC75-16D329F31978}" type="datetimeFigureOut">
               <a:rPr lang="pt-PT" smtClean="0"/>
-              <a:t>27/11/2023</a:t>
+              <a:t>03/12/2023</a:t>
             </a:fld>
             <a:endParaRPr lang="pt-PT"/>
           </a:p>
@@ -1810,7 +1815,7 @@
           <a:p>
             <a:fld id="{45A5B844-6202-4F57-AC75-16D329F31978}" type="datetimeFigureOut">
               <a:rPr lang="pt-PT" smtClean="0"/>
-              <a:t>27/11/2023</a:t>
+              <a:t>03/12/2023</a:t>
             </a:fld>
             <a:endParaRPr lang="pt-PT"/>
           </a:p>
@@ -1951,7 +1956,7 @@
           <a:p>
             <a:fld id="{45A5B844-6202-4F57-AC75-16D329F31978}" type="datetimeFigureOut">
               <a:rPr lang="pt-PT" smtClean="0"/>
-              <a:t>27/11/2023</a:t>
+              <a:t>03/12/2023</a:t>
             </a:fld>
             <a:endParaRPr lang="pt-PT"/>
           </a:p>
@@ -2064,7 +2069,7 @@
           <a:p>
             <a:fld id="{45A5B844-6202-4F57-AC75-16D329F31978}" type="datetimeFigureOut">
               <a:rPr lang="pt-PT" smtClean="0"/>
-              <a:t>27/11/2023</a:t>
+              <a:t>03/12/2023</a:t>
             </a:fld>
             <a:endParaRPr lang="pt-PT"/>
           </a:p>
@@ -2375,7 +2380,7 @@
           <a:p>
             <a:fld id="{45A5B844-6202-4F57-AC75-16D329F31978}" type="datetimeFigureOut">
               <a:rPr lang="pt-PT" smtClean="0"/>
-              <a:t>27/11/2023</a:t>
+              <a:t>03/12/2023</a:t>
             </a:fld>
             <a:endParaRPr lang="pt-PT"/>
           </a:p>
@@ -2663,7 +2668,7 @@
           <a:p>
             <a:fld id="{45A5B844-6202-4F57-AC75-16D329F31978}" type="datetimeFigureOut">
               <a:rPr lang="pt-PT" smtClean="0"/>
-              <a:t>27/11/2023</a:t>
+              <a:t>03/12/2023</a:t>
             </a:fld>
             <a:endParaRPr lang="pt-PT"/>
           </a:p>
@@ -2904,7 +2909,7 @@
           <a:p>
             <a:fld id="{45A5B844-6202-4F57-AC75-16D329F31978}" type="datetimeFigureOut">
               <a:rPr lang="pt-PT" smtClean="0"/>
-              <a:t>27/11/2023</a:t>
+              <a:t>03/12/2023</a:t>
             </a:fld>
             <a:endParaRPr lang="pt-PT"/>
           </a:p>
@@ -3377,7 +3382,7 @@
         </p:blipFill>
         <p:spPr>
           <a:xfrm>
-            <a:off x="10403205" y="2081212"/>
+            <a:off x="10403205" y="1938707"/>
             <a:ext cx="914400" cy="895350"/>
           </a:xfrm>
           <a:prstGeom prst="rect">
@@ -3659,7 +3664,7 @@
         </p:nvSpPr>
         <p:spPr>
           <a:xfrm>
-            <a:off x="2434591" y="889080"/>
+            <a:off x="2475654" y="888776"/>
             <a:ext cx="285748" cy="276999"/>
           </a:xfrm>
           <a:prstGeom prst="rect">
@@ -5407,18 +5412,13 @@
           <a:p>
             <a:pPr algn="ctr"/>
             <a:r>
-              <a:rPr lang="pt-PT" sz="1200" dirty="0" err="1">
+              <a:rPr lang="pt-PT" sz="1200" dirty="0">
                 <a:solidFill>
                   <a:schemeClr val="tx1"/>
                 </a:solidFill>
               </a:rPr>
               <a:t>Tipo_objeto</a:t>
             </a:r>
-            <a:endParaRPr lang="pt-PT" sz="1200" dirty="0">
-              <a:solidFill>
-                <a:schemeClr val="tx1"/>
-              </a:solidFill>
-            </a:endParaRPr>
           </a:p>
         </p:txBody>
       </p:sp>
@@ -5677,6 +5677,489 @@
         <p:spPr>
           <a:xfrm>
             <a:off x="2492089" y="4506844"/>
+            <a:ext cx="285748" cy="276999"/>
+          </a:xfrm>
+          <a:prstGeom prst="rect">
+            <a:avLst/>
+          </a:prstGeom>
+          <a:noFill/>
+        </p:spPr>
+        <p:txBody>
+          <a:bodyPr wrap="square" rtlCol="0">
+            <a:spAutoFit/>
+          </a:bodyPr>
+          <a:lstStyle/>
+          <a:p>
+            <a:r>
+              <a:rPr lang="pt-PT" sz="1200" dirty="0"/>
+              <a:t>n</a:t>
+            </a:r>
+          </a:p>
+        </p:txBody>
+      </p:sp>
+      <p:grpSp>
+        <p:nvGrpSpPr>
+          <p:cNvPr id="11" name="Agrupar 10">
+            <a:extLst>
+              <a:ext uri="{FF2B5EF4-FFF2-40B4-BE49-F238E27FC236}">
+                <a16:creationId xmlns:a16="http://schemas.microsoft.com/office/drawing/2014/main" id="{880EFE1E-53C9-5D07-DA70-9673EDD19E81}"/>
+              </a:ext>
+            </a:extLst>
+          </p:cNvPr>
+          <p:cNvGrpSpPr/>
+          <p:nvPr/>
+        </p:nvGrpSpPr>
+        <p:grpSpPr>
+          <a:xfrm>
+            <a:off x="434778" y="428624"/>
+            <a:ext cx="1104900" cy="409575"/>
+            <a:chOff x="6776855" y="2118897"/>
+            <a:chExt cx="1104900" cy="409575"/>
+          </a:xfrm>
+        </p:grpSpPr>
+        <p:pic>
+          <p:nvPicPr>
+            <p:cNvPr id="3" name="Imagem 2">
+              <a:extLst>
+                <a:ext uri="{FF2B5EF4-FFF2-40B4-BE49-F238E27FC236}">
+                  <a16:creationId xmlns:a16="http://schemas.microsoft.com/office/drawing/2014/main" id="{B27348D5-4DBD-5D18-B885-51DC638C2ABD}"/>
+                </a:ext>
+              </a:extLst>
+            </p:cNvPr>
+            <p:cNvPicPr>
+              <a:picLocks noChangeAspect="1"/>
+            </p:cNvPicPr>
+            <p:nvPr/>
+          </p:nvPicPr>
+          <p:blipFill>
+            <a:blip r:embed="rId8"/>
+            <a:stretch>
+              <a:fillRect/>
+            </a:stretch>
+          </p:blipFill>
+          <p:spPr>
+            <a:xfrm>
+              <a:off x="6815965" y="2133136"/>
+              <a:ext cx="274773" cy="194105"/>
+            </a:xfrm>
+            <a:prstGeom prst="rect">
+              <a:avLst/>
+            </a:prstGeom>
+          </p:spPr>
+        </p:pic>
+        <p:sp>
+          <p:nvSpPr>
+            <p:cNvPr id="9" name="Retângulo 8">
+              <a:extLst>
+                <a:ext uri="{FF2B5EF4-FFF2-40B4-BE49-F238E27FC236}">
+                  <a16:creationId xmlns:a16="http://schemas.microsoft.com/office/drawing/2014/main" id="{C72B1462-1D51-22F3-040E-2EED85069DF5}"/>
+                </a:ext>
+              </a:extLst>
+            </p:cNvPr>
+            <p:cNvSpPr/>
+            <p:nvPr/>
+          </p:nvSpPr>
+          <p:spPr>
+            <a:xfrm>
+              <a:off x="6776855" y="2118897"/>
+              <a:ext cx="1104900" cy="409575"/>
+            </a:xfrm>
+            <a:prstGeom prst="rect">
+              <a:avLst/>
+            </a:prstGeom>
+            <a:noFill/>
+            <a:ln w="19050"/>
+          </p:spPr>
+          <p:style>
+            <a:lnRef idx="2">
+              <a:schemeClr val="accent1">
+                <a:shade val="15000"/>
+              </a:schemeClr>
+            </a:lnRef>
+            <a:fillRef idx="1">
+              <a:schemeClr val="accent1"/>
+            </a:fillRef>
+            <a:effectRef idx="0">
+              <a:schemeClr val="accent1"/>
+            </a:effectRef>
+            <a:fontRef idx="minor">
+              <a:schemeClr val="lt1"/>
+            </a:fontRef>
+          </p:style>
+          <p:txBody>
+            <a:bodyPr rtlCol="0" anchor="b"/>
+            <a:lstStyle/>
+            <a:p>
+              <a:pPr algn="ctr"/>
+              <a:r>
+                <a:rPr lang="pt-PT" sz="1200" dirty="0">
+                  <a:solidFill>
+                    <a:schemeClr val="tx1"/>
+                  </a:solidFill>
+                </a:rPr>
+                <a:t>Rio</a:t>
+              </a:r>
+            </a:p>
+          </p:txBody>
+        </p:sp>
+      </p:grpSp>
+      <p:pic>
+        <p:nvPicPr>
+          <p:cNvPr id="14" name="Imagem 13">
+            <a:extLst>
+              <a:ext uri="{FF2B5EF4-FFF2-40B4-BE49-F238E27FC236}">
+                <a16:creationId xmlns:a16="http://schemas.microsoft.com/office/drawing/2014/main" id="{CAA88360-3D96-1975-CC25-1E7B75660DE7}"/>
+              </a:ext>
+            </a:extLst>
+          </p:cNvPr>
+          <p:cNvPicPr>
+            <a:picLocks noChangeAspect="1"/>
+          </p:cNvPicPr>
+          <p:nvPr/>
+        </p:nvPicPr>
+        <p:blipFill>
+          <a:blip r:embed="rId2">
+            <a:extLst>
+              <a:ext uri="{BEBA8EAE-BF5A-486C-A8C5-ECC9F3942E4B}">
+                <a14:imgProps xmlns:a14="http://schemas.microsoft.com/office/drawing/2010/main">
+                  <a14:imgLayer r:embed="rId3">
+                    <a14:imgEffect>
+                      <a14:backgroundRemoval t="3191" b="94681" l="7292" r="95833">
+                        <a14:foregroundMark x1="27083" y1="34043" x2="27083" y2="45745"/>
+                        <a14:foregroundMark x1="71875" y1="33535" x2="71875" y2="34043"/>
+                        <a14:foregroundMark x1="53125" y1="38298" x2="53125" y2="38298"/>
+                        <a14:foregroundMark x1="58333" y1="29787" x2="58333" y2="29787"/>
+                        <a14:foregroundMark x1="46875" y1="25532" x2="46875" y2="25532"/>
+                        <a14:foregroundMark x1="52083" y1="94681" x2="52083" y2="94681"/>
+                        <a14:foregroundMark x1="56250" y1="93617" x2="94792" y2="52128"/>
+                        <a14:foregroundMark x1="94792" y1="52128" x2="77501" y2="31035"/>
+                        <a14:foregroundMark x1="47101" y1="15462" x2="8333" y2="50000"/>
+                        <a14:foregroundMark x1="8333" y1="50000" x2="51042" y2="92553"/>
+                        <a14:foregroundMark x1="48958" y1="94681" x2="9375" y2="50000"/>
+                        <a14:foregroundMark x1="9375" y1="50000" x2="8333" y2="48936"/>
+                        <a14:foregroundMark x1="15625" y1="40426" x2="50963" y2="18279"/>
+                        <a14:foregroundMark x1="50000" y1="4255" x2="23958" y2="31915"/>
+                        <a14:foregroundMark x1="95833" y1="50000" x2="95833" y2="50000"/>
+                        <a14:backgroundMark x1="23958" y1="12766" x2="23958" y2="12766"/>
+                        <a14:backgroundMark x1="26042" y1="11702" x2="39583" y2="0"/>
+                        <a14:backgroundMark x1="36458" y1="9574" x2="44792" y2="2128"/>
+                        <a14:backgroundMark x1="57292" y1="1064" x2="86458" y2="22340"/>
+                        <a14:backgroundMark x1="73958" y1="95745" x2="88542" y2="87234"/>
+                        <a14:backgroundMark x1="83333" y1="84043" x2="98958" y2="61702"/>
+                      </a14:backgroundRemoval>
+                    </a14:imgEffect>
+                  </a14:imgLayer>
+                </a14:imgProps>
+              </a:ext>
+            </a:extLst>
+          </a:blip>
+          <a:stretch>
+            <a:fillRect/>
+          </a:stretch>
+        </p:blipFill>
+        <p:spPr>
+          <a:xfrm>
+            <a:off x="530028" y="1057275"/>
+            <a:ext cx="914400" cy="895350"/>
+          </a:xfrm>
+          <a:prstGeom prst="rect">
+            <a:avLst/>
+          </a:prstGeom>
+        </p:spPr>
+      </p:pic>
+      <p:sp>
+        <p:nvSpPr>
+          <p:cNvPr id="16" name="CaixaDeTexto 15">
+            <a:extLst>
+              <a:ext uri="{FF2B5EF4-FFF2-40B4-BE49-F238E27FC236}">
+                <a16:creationId xmlns:a16="http://schemas.microsoft.com/office/drawing/2014/main" id="{ACFECCEB-B751-94CA-ADB4-E1E02262E7BE}"/>
+              </a:ext>
+            </a:extLst>
+          </p:cNvPr>
+          <p:cNvSpPr txBox="1"/>
+          <p:nvPr/>
+        </p:nvSpPr>
+        <p:spPr>
+          <a:xfrm>
+            <a:off x="1060442" y="947737"/>
+            <a:ext cx="285748" cy="276999"/>
+          </a:xfrm>
+          <a:prstGeom prst="rect">
+            <a:avLst/>
+          </a:prstGeom>
+          <a:noFill/>
+        </p:spPr>
+        <p:txBody>
+          <a:bodyPr wrap="square" rtlCol="0">
+            <a:spAutoFit/>
+          </a:bodyPr>
+          <a:lstStyle/>
+          <a:p>
+            <a:r>
+              <a:rPr lang="pt-PT" sz="1200" dirty="0"/>
+              <a:t>1</a:t>
+            </a:r>
+          </a:p>
+        </p:txBody>
+      </p:sp>
+      <p:cxnSp>
+        <p:nvCxnSpPr>
+          <p:cNvPr id="17" name="Conexão reta 16">
+            <a:extLst>
+              <a:ext uri="{FF2B5EF4-FFF2-40B4-BE49-F238E27FC236}">
+                <a16:creationId xmlns:a16="http://schemas.microsoft.com/office/drawing/2014/main" id="{65B72A8F-69CA-4ED3-27FB-5515AE7650C5}"/>
+              </a:ext>
+            </a:extLst>
+          </p:cNvPr>
+          <p:cNvCxnSpPr>
+            <a:cxnSpLocks/>
+            <a:endCxn id="14" idx="0"/>
+          </p:cNvCxnSpPr>
+          <p:nvPr/>
+        </p:nvCxnSpPr>
+        <p:spPr>
+          <a:xfrm>
+            <a:off x="987228" y="838200"/>
+            <a:ext cx="0" cy="219075"/>
+          </a:xfrm>
+          <a:prstGeom prst="line">
+            <a:avLst/>
+          </a:prstGeom>
+          <a:ln w="28575">
+            <a:solidFill>
+              <a:schemeClr val="tx1"/>
+            </a:solidFill>
+          </a:ln>
+        </p:spPr>
+        <p:style>
+          <a:lnRef idx="1">
+            <a:schemeClr val="accent1"/>
+          </a:lnRef>
+          <a:fillRef idx="0">
+            <a:schemeClr val="accent1"/>
+          </a:fillRef>
+          <a:effectRef idx="0">
+            <a:schemeClr val="accent1"/>
+          </a:effectRef>
+          <a:fontRef idx="minor">
+            <a:schemeClr val="tx1"/>
+          </a:fontRef>
+        </p:style>
+      </p:cxnSp>
+      <p:grpSp>
+        <p:nvGrpSpPr>
+          <p:cNvPr id="19" name="Agrupar 18">
+            <a:extLst>
+              <a:ext uri="{FF2B5EF4-FFF2-40B4-BE49-F238E27FC236}">
+                <a16:creationId xmlns:a16="http://schemas.microsoft.com/office/drawing/2014/main" id="{A3DEB48E-B419-8BD2-6660-FFE436F2338C}"/>
+              </a:ext>
+            </a:extLst>
+          </p:cNvPr>
+          <p:cNvGrpSpPr/>
+          <p:nvPr/>
+        </p:nvGrpSpPr>
+        <p:grpSpPr>
+          <a:xfrm>
+            <a:off x="942610" y="1895496"/>
+            <a:ext cx="102203" cy="409575"/>
+            <a:chOff x="4941570" y="2731294"/>
+            <a:chExt cx="95250" cy="814388"/>
+          </a:xfrm>
+        </p:grpSpPr>
+        <p:cxnSp>
+          <p:nvCxnSpPr>
+            <p:cNvPr id="20" name="Conexão reta 19">
+              <a:extLst>
+                <a:ext uri="{FF2B5EF4-FFF2-40B4-BE49-F238E27FC236}">
+                  <a16:creationId xmlns:a16="http://schemas.microsoft.com/office/drawing/2014/main" id="{FDF67361-387D-FB3C-5BFA-360DC7C8AA32}"/>
+                </a:ext>
+              </a:extLst>
+            </p:cNvPr>
+            <p:cNvCxnSpPr>
+              <a:cxnSpLocks/>
+            </p:cNvCxnSpPr>
+            <p:nvPr/>
+          </p:nvCxnSpPr>
+          <p:spPr>
+            <a:xfrm>
+              <a:off x="5036820" y="2731294"/>
+              <a:ext cx="0" cy="814388"/>
+            </a:xfrm>
+            <a:prstGeom prst="line">
+              <a:avLst/>
+            </a:prstGeom>
+            <a:ln w="28575">
+              <a:solidFill>
+                <a:schemeClr val="tx1"/>
+              </a:solidFill>
+            </a:ln>
+          </p:spPr>
+          <p:style>
+            <a:lnRef idx="1">
+              <a:schemeClr val="accent1"/>
+            </a:lnRef>
+            <a:fillRef idx="0">
+              <a:schemeClr val="accent1"/>
+            </a:fillRef>
+            <a:effectRef idx="0">
+              <a:schemeClr val="accent1"/>
+            </a:effectRef>
+            <a:fontRef idx="minor">
+              <a:schemeClr val="tx1"/>
+            </a:fontRef>
+          </p:style>
+        </p:cxnSp>
+        <p:cxnSp>
+          <p:nvCxnSpPr>
+            <p:cNvPr id="21" name="Conexão reta 20">
+              <a:extLst>
+                <a:ext uri="{FF2B5EF4-FFF2-40B4-BE49-F238E27FC236}">
+                  <a16:creationId xmlns:a16="http://schemas.microsoft.com/office/drawing/2014/main" id="{2A0FC540-9126-EEFB-B9A0-D53D4E77AF72}"/>
+                </a:ext>
+              </a:extLst>
+            </p:cNvPr>
+            <p:cNvCxnSpPr>
+              <a:cxnSpLocks/>
+            </p:cNvCxnSpPr>
+            <p:nvPr/>
+          </p:nvCxnSpPr>
+          <p:spPr>
+            <a:xfrm>
+              <a:off x="4941570" y="2731294"/>
+              <a:ext cx="0" cy="814388"/>
+            </a:xfrm>
+            <a:prstGeom prst="line">
+              <a:avLst/>
+            </a:prstGeom>
+            <a:ln w="28575">
+              <a:solidFill>
+                <a:schemeClr val="tx1"/>
+              </a:solidFill>
+            </a:ln>
+          </p:spPr>
+          <p:style>
+            <a:lnRef idx="1">
+              <a:schemeClr val="accent1"/>
+            </a:lnRef>
+            <a:fillRef idx="0">
+              <a:schemeClr val="accent1"/>
+            </a:fillRef>
+            <a:effectRef idx="0">
+              <a:schemeClr val="accent1"/>
+            </a:effectRef>
+            <a:fontRef idx="minor">
+              <a:schemeClr val="tx1"/>
+            </a:fontRef>
+          </p:style>
+        </p:cxnSp>
+      </p:grpSp>
+      <p:cxnSp>
+        <p:nvCxnSpPr>
+          <p:cNvPr id="23" name="Conexão: Ângulo Reto 22">
+            <a:extLst>
+              <a:ext uri="{FF2B5EF4-FFF2-40B4-BE49-F238E27FC236}">
+                <a16:creationId xmlns:a16="http://schemas.microsoft.com/office/drawing/2014/main" id="{335147C0-41E6-904C-001C-33DD392B042D}"/>
+              </a:ext>
+            </a:extLst>
+          </p:cNvPr>
+          <p:cNvCxnSpPr>
+            <a:cxnSpLocks/>
+            <a:endCxn id="8" idx="1"/>
+          </p:cNvCxnSpPr>
+          <p:nvPr/>
+        </p:nvCxnSpPr>
+        <p:spPr>
+          <a:xfrm>
+            <a:off x="936894" y="1868735"/>
+            <a:ext cx="1004304" cy="530865"/>
+          </a:xfrm>
+          <a:prstGeom prst="bentConnector3">
+            <a:avLst>
+              <a:gd name="adj1" fmla="val -953"/>
+            </a:avLst>
+          </a:prstGeom>
+          <a:ln w="28575">
+            <a:solidFill>
+              <a:schemeClr val="tx1"/>
+            </a:solidFill>
+          </a:ln>
+        </p:spPr>
+        <p:style>
+          <a:lnRef idx="1">
+            <a:schemeClr val="accent1"/>
+          </a:lnRef>
+          <a:fillRef idx="0">
+            <a:schemeClr val="accent1"/>
+          </a:fillRef>
+          <a:effectRef idx="0">
+            <a:schemeClr val="accent1"/>
+          </a:effectRef>
+          <a:fontRef idx="minor">
+            <a:schemeClr val="tx1"/>
+          </a:fontRef>
+        </p:style>
+      </p:cxnSp>
+      <p:cxnSp>
+        <p:nvCxnSpPr>
+          <p:cNvPr id="35" name="Conexão: Ângulo Reto 34">
+            <a:extLst>
+              <a:ext uri="{FF2B5EF4-FFF2-40B4-BE49-F238E27FC236}">
+                <a16:creationId xmlns:a16="http://schemas.microsoft.com/office/drawing/2014/main" id="{E2C8F259-E3CB-9DCE-A1C0-CDD2EE5D4B63}"/>
+              </a:ext>
+            </a:extLst>
+          </p:cNvPr>
+          <p:cNvCxnSpPr>
+            <a:cxnSpLocks/>
+            <a:endCxn id="12" idx="1"/>
+          </p:cNvCxnSpPr>
+          <p:nvPr/>
+        </p:nvCxnSpPr>
+        <p:spPr>
+          <a:xfrm>
+            <a:off x="1045951" y="1910680"/>
+            <a:ext cx="909534" cy="417442"/>
+          </a:xfrm>
+          <a:prstGeom prst="bentConnector3">
+            <a:avLst>
+              <a:gd name="adj1" fmla="val 194"/>
+            </a:avLst>
+          </a:prstGeom>
+          <a:ln w="28575">
+            <a:solidFill>
+              <a:schemeClr val="tx1"/>
+            </a:solidFill>
+          </a:ln>
+        </p:spPr>
+        <p:style>
+          <a:lnRef idx="1">
+            <a:schemeClr val="accent1"/>
+          </a:lnRef>
+          <a:fillRef idx="0">
+            <a:schemeClr val="accent1"/>
+          </a:fillRef>
+          <a:effectRef idx="0">
+            <a:schemeClr val="accent1"/>
+          </a:effectRef>
+          <a:fontRef idx="minor">
+            <a:schemeClr val="tx1"/>
+          </a:fontRef>
+        </p:style>
+      </p:cxnSp>
+      <p:sp>
+        <p:nvSpPr>
+          <p:cNvPr id="63" name="CaixaDeTexto 62">
+            <a:extLst>
+              <a:ext uri="{FF2B5EF4-FFF2-40B4-BE49-F238E27FC236}">
+                <a16:creationId xmlns:a16="http://schemas.microsoft.com/office/drawing/2014/main" id="{949959B3-5BF6-49F8-503D-1538DAD52332}"/>
+              </a:ext>
+            </a:extLst>
+          </p:cNvPr>
+          <p:cNvSpPr txBox="1"/>
+          <p:nvPr/>
+        </p:nvSpPr>
+        <p:spPr>
+          <a:xfrm>
+            <a:off x="1064599" y="1800207"/>
             <a:ext cx="285748" cy="276999"/>
           </a:xfrm>
           <a:prstGeom prst="rect">

</xml_diff>